<commit_message>
final version after the talk
</commit_message>
<xml_diff>
--- a/SalesForecasting.pptx
+++ b/SalesForecasting.pptx
@@ -198,7 +198,7 @@
     </mc:Fallback>
   </mc:AlternateContent>
   <c:pivotSource>
-    <c:name>[Book1 (version 1).xlsb]Sheet5!PivotTable2</c:name>
+    <c:name>[Book1]Sheet2!PivotTable1</c:name>
     <c:fmtId val="3"/>
   </c:pivotSource>
   <c:chart>
@@ -238,7 +238,7 @@
         <c:idx val="0"/>
         <c:spPr>
           <a:solidFill>
-            <a:schemeClr val="accent6"/>
+            <a:schemeClr val="accent1"/>
           </a:solidFill>
           <a:ln>
             <a:noFill/>
@@ -253,7 +253,7 @@
         <c:idx val="1"/>
         <c:spPr>
           <a:solidFill>
-            <a:schemeClr val="accent6"/>
+            <a:schemeClr val="accent1"/>
           </a:solidFill>
           <a:ln>
             <a:noFill/>
@@ -268,7 +268,7 @@
         <c:idx val="2"/>
         <c:spPr>
           <a:solidFill>
-            <a:schemeClr val="accent6"/>
+            <a:schemeClr val="accent1"/>
           </a:solidFill>
           <a:ln>
             <a:noFill/>
@@ -283,7 +283,7 @@
         <c:idx val="3"/>
         <c:spPr>
           <a:solidFill>
-            <a:schemeClr val="accent6"/>
+            <a:schemeClr val="accent1"/>
           </a:solidFill>
           <a:ln>
             <a:noFill/>
@@ -306,7 +306,7 @@
           <c:order val="0"/>
           <c:tx>
             <c:strRef>
-              <c:f>Sheet5!$B$1</c:f>
+              <c:f>Sheet2!$B$1</c:f>
               <c:strCache>
                 <c:ptCount val="1"/>
                 <c:pt idx="0">
@@ -317,7 +317,7 @@
           </c:tx>
           <c:spPr>
             <a:solidFill>
-              <a:schemeClr val="accent6"/>
+              <a:schemeClr val="accent1"/>
             </a:solidFill>
             <a:ln>
               <a:noFill/>
@@ -327,43 +327,35 @@
           <c:invertIfNegative val="0"/>
           <c:cat>
             <c:multiLvlStrRef>
-              <c:f>Sheet5!$A$2:$A$12</c:f>
+              <c:f>Sheet2!$A$2:$A$10</c:f>
               <c:multiLvlStrCache>
-                <c:ptCount val="4"/>
+                <c:ptCount val="6"/>
                 <c:lvl>
                   <c:pt idx="0">
                     <c:v>1</c:v>
                   </c:pt>
                   <c:pt idx="1">
+                    <c:v>4</c:v>
+                  </c:pt>
+                  <c:pt idx="2">
+                    <c:v>6</c:v>
+                  </c:pt>
+                  <c:pt idx="3">
                     <c:v>8</c:v>
                   </c:pt>
-                  <c:pt idx="2">
+                  <c:pt idx="4">
                     <c:v>8</c:v>
                   </c:pt>
-                  <c:pt idx="3">
+                  <c:pt idx="5">
                     <c:v>16</c:v>
                   </c:pt>
                 </c:lvl>
                 <c:lvl>
                   <c:pt idx="0">
-                    <c:v>Local</c:v>
+                    <c:v>Local loop</c:v>
                   </c:pt>
-                  <c:pt idx="1">
-                    <c:v>Local</c:v>
-                  </c:pt>
-                  <c:pt idx="2">
-                    <c:v>Databricks</c:v>
-                  </c:pt>
-                </c:lvl>
-                <c:lvl>
-                  <c:pt idx="0">
-                    <c:v>Single loop</c:v>
-                  </c:pt>
-                  <c:pt idx="1">
-                    <c:v>Parallel Loop</c:v>
-                  </c:pt>
-                  <c:pt idx="2">
-                    <c:v>Distributed Loop</c:v>
+                  <c:pt idx="4">
+                    <c:v>Distributed</c:v>
                   </c:pt>
                 </c:lvl>
               </c:multiLvlStrCache>
@@ -371,20 +363,26 @@
           </c:cat>
           <c:val>
             <c:numRef>
-              <c:f>Sheet5!$B$2:$B$12</c:f>
+              <c:f>Sheet2!$B$2:$B$10</c:f>
               <c:numCache>
                 <c:formatCode>General</c:formatCode>
-                <c:ptCount val="4"/>
+                <c:ptCount val="6"/>
                 <c:pt idx="0">
-                  <c:v>3013</c:v>
+                  <c:v>3000</c:v>
                 </c:pt>
                 <c:pt idx="1">
                   <c:v>1380</c:v>
                 </c:pt>
                 <c:pt idx="2">
-                  <c:v>360</c:v>
+                  <c:v>1020</c:v>
                 </c:pt>
                 <c:pt idx="3">
+                  <c:v>960</c:v>
+                </c:pt>
+                <c:pt idx="4">
+                  <c:v>300</c:v>
+                </c:pt>
+                <c:pt idx="5">
                   <c:v>180</c:v>
                 </c:pt>
               </c:numCache>
@@ -392,7 +390,7 @@
           </c:val>
           <c:extLst>
             <c:ext xmlns:c16="http://schemas.microsoft.com/office/drawing/2014/chart" uri="{C3380CC4-5D6E-409C-BE32-E72D297353CC}">
-              <c16:uniqueId val="{00000000-196B-4B89-AAF7-C2286615E8E2}"/>
+              <c16:uniqueId val="{00000000-7F50-4A09-8411-318851FBA5CC}"/>
             </c:ext>
           </c:extLst>
         </c:ser>
@@ -406,11 +404,11 @@
         </c:dLbls>
         <c:gapWidth val="219"/>
         <c:overlap val="-27"/>
-        <c:axId val="1979694704"/>
-        <c:axId val="1950253216"/>
+        <c:axId val="489757791"/>
+        <c:axId val="1103927039"/>
       </c:barChart>
       <c:catAx>
-        <c:axId val="1979694704"/>
+        <c:axId val="489757791"/>
         <c:scaling>
           <c:orientation val="minMax"/>
         </c:scaling>
@@ -453,7 +451,7 @@
             <a:endParaRPr lang="en-US"/>
           </a:p>
         </c:txPr>
-        <c:crossAx val="1950253216"/>
+        <c:crossAx val="1103927039"/>
         <c:crosses val="autoZero"/>
         <c:auto val="1"/>
         <c:lblAlgn val="ctr"/>
@@ -461,7 +459,7 @@
         <c:noMultiLvlLbl val="0"/>
       </c:catAx>
       <c:valAx>
-        <c:axId val="1950253216"/>
+        <c:axId val="1103927039"/>
         <c:scaling>
           <c:orientation val="minMax"/>
         </c:scaling>
@@ -512,7 +510,7 @@
             <a:endParaRPr lang="en-US"/>
           </a:p>
         </c:txPr>
-        <c:crossAx val="1979694704"/>
+        <c:crossAx val="489757791"/>
         <c:crosses val="autoZero"/>
         <c:crossBetween val="between"/>
       </c:valAx>
@@ -606,10 +604,13 @@
 </file>
 
 <file path=ppt/charts/colors1.xml><?xml version="1.0" encoding="utf-8"?>
-<cs:colorStyle xmlns:cs="http://schemas.microsoft.com/office/drawing/2012/chartStyle" xmlns:a="http://schemas.openxmlformats.org/drawingml/2006/main" meth="cycle" id="13">
+<cs:colorStyle xmlns:cs="http://schemas.microsoft.com/office/drawing/2012/chartStyle" xmlns:a="http://schemas.openxmlformats.org/drawingml/2006/main" meth="cycle" id="10">
+  <a:schemeClr val="accent1"/>
+  <a:schemeClr val="accent2"/>
+  <a:schemeClr val="accent3"/>
+  <a:schemeClr val="accent4"/>
+  <a:schemeClr val="accent5"/>
   <a:schemeClr val="accent6"/>
-  <a:schemeClr val="accent5"/>
-  <a:schemeClr val="accent4"/>
   <cs:variation/>
   <cs:variation>
     <a:lumMod val="60000"/>
@@ -2305,57 +2306,77 @@
           <a:bodyPr/>
           <a:lstStyle/>
           <a:p>
+            <a:pPr marL="0" marR="0" lvl="0" indent="0" algn="l" defTabSz="914400" rtl="0" eaLnBrk="0" fontAlgn="base" latinLnBrk="0" hangingPunct="0">
+              <a:lnSpc>
+                <a:spcPct val="100000"/>
+              </a:lnSpc>
+              <a:spcBef>
+                <a:spcPct val="30000"/>
+              </a:spcBef>
+              <a:spcAft>
+                <a:spcPct val="0"/>
+              </a:spcAft>
+              <a:buClrTx/>
+              <a:buSzTx/>
+              <a:buFontTx/>
+              <a:buNone/>
+              <a:tabLst/>
+              <a:defRPr/>
+            </a:pPr>
             <a:r>
               <a:rPr lang="es-ES" dirty="0"/>
-              <a:t>Ya existían las UDF “estándar” y se pueden registrar como funciones en </a:t>
+              <a:t>Si tenemos </a:t>
             </a:r>
             <a:r>
               <a:rPr lang="es-ES" dirty="0" err="1"/>
-              <a:t>Spark</a:t>
+              <a:t>outliers</a:t>
             </a:r>
             <a:r>
               <a:rPr lang="es-ES" dirty="0"/>
-              <a:t> (así se puede combinar </a:t>
-            </a:r>
-            <a:r>
-              <a:rPr lang="es-ES" dirty="0" err="1"/>
-              <a:t>spark</a:t>
-            </a:r>
+              <a:t> y dato faltante puede afectar a nuestro modelo y a la incertidumbre en sus predicciones</a:t>
+            </a:r>
+          </a:p>
+          <a:p>
+            <a:pPr marL="0" marR="0" lvl="0" indent="0" algn="l" defTabSz="914400" rtl="0" eaLnBrk="0" fontAlgn="base" latinLnBrk="0" hangingPunct="0">
+              <a:lnSpc>
+                <a:spcPct val="100000"/>
+              </a:lnSpc>
+              <a:spcBef>
+                <a:spcPct val="30000"/>
+              </a:spcBef>
+              <a:spcAft>
+                <a:spcPct val="0"/>
+              </a:spcAft>
+              <a:buClrTx/>
+              <a:buSzTx/>
+              <a:buFontTx/>
+              <a:buNone/>
+              <a:tabLst/>
+              <a:defRPr/>
+            </a:pPr>
+            <a:endParaRPr lang="es-ES" dirty="0"/>
+          </a:p>
+          <a:p>
+            <a:pPr marL="0" marR="0" lvl="0" indent="0" algn="l" defTabSz="914400" rtl="0" eaLnBrk="0" fontAlgn="base" latinLnBrk="0" hangingPunct="0">
+              <a:lnSpc>
+                <a:spcPct val="100000"/>
+              </a:lnSpc>
+              <a:spcBef>
+                <a:spcPct val="30000"/>
+              </a:spcBef>
+              <a:spcAft>
+                <a:spcPct val="0"/>
+              </a:spcAft>
+              <a:buClrTx/>
+              <a:buSzTx/>
+              <a:buFontTx/>
+              <a:buNone/>
+              <a:tabLst/>
+              <a:defRPr/>
+            </a:pPr>
             <a:r>
               <a:rPr lang="es-ES" dirty="0"/>
-              <a:t> </a:t>
-            </a:r>
-            <a:r>
-              <a:rPr lang="es-ES" dirty="0" err="1"/>
-              <a:t>streaming</a:t>
-            </a:r>
-            <a:r>
-              <a:rPr lang="es-ES" dirty="0"/>
-              <a:t> con modelos de ML, se pueden registrar como funciones) pero el rendimiento cuando se trabaja con objetos Pandas (</a:t>
-            </a:r>
-            <a:r>
-              <a:rPr lang="es-ES" dirty="0" err="1"/>
-              <a:t>dataframes</a:t>
-            </a:r>
-            <a:r>
-              <a:rPr lang="es-ES" dirty="0"/>
-              <a:t>, Series) puede ser bastante deficiente, y aparecen las </a:t>
-            </a:r>
-            <a:r>
-              <a:rPr lang="es-ES" dirty="0" err="1"/>
-              <a:t>PandasUDF</a:t>
-            </a:r>
-            <a:r>
-              <a:rPr lang="es-ES" dirty="0"/>
-              <a:t> que soportan vectorización y </a:t>
-            </a:r>
-            <a:r>
-              <a:rPr lang="es-ES" dirty="0" err="1"/>
-              <a:t>chunking</a:t>
-            </a:r>
-            <a:r>
-              <a:rPr lang="es-ES" dirty="0"/>
-              <a:t> en el manejo de los objetos de datos (gracias al uso de Arrow) </a:t>
+              <a:t>El dato faltante puede generar errores directamente si antes no lo interpolamos</a:t>
             </a:r>
           </a:p>
         </p:txBody>
@@ -2383,7 +2404,7 @@
               <a:pPr>
                 <a:defRPr/>
               </a:pPr>
-              <a:t>20</a:t>
+              <a:t>13</a:t>
             </a:fld>
             <a:endParaRPr lang="en-US"/>
           </a:p>
@@ -2392,7 +2413,7 @@
     </p:spTree>
     <p:extLst>
       <p:ext uri="{BB962C8B-B14F-4D97-AF65-F5344CB8AC3E}">
-        <p14:creationId xmlns:p14="http://schemas.microsoft.com/office/powerpoint/2010/main" val="69715582"/>
+        <p14:creationId xmlns:p14="http://schemas.microsoft.com/office/powerpoint/2010/main" val="1068841822"/>
       </p:ext>
     </p:extLst>
   </p:cSld>
@@ -2446,6 +2467,237 @@
           <a:bodyPr/>
           <a:lstStyle/>
           <a:p>
+            <a:endParaRPr lang="es-ES" dirty="0"/>
+          </a:p>
+        </p:txBody>
+      </p:sp>
+      <p:sp>
+        <p:nvSpPr>
+          <p:cNvPr id="4" name="Slide Number Placeholder 3"/>
+          <p:cNvSpPr>
+            <a:spLocks noGrp="1"/>
+          </p:cNvSpPr>
+          <p:nvPr>
+            <p:ph type="sldNum" sz="quarter" idx="5"/>
+          </p:nvPr>
+        </p:nvSpPr>
+        <p:spPr/>
+        <p:txBody>
+          <a:bodyPr/>
+          <a:lstStyle/>
+          <a:p>
+            <a:pPr>
+              <a:defRPr/>
+            </a:pPr>
+            <a:fld id="{68148307-6EF4-4902-A089-985E6404F016}" type="slidenum">
+              <a:rPr lang="en-US" smtClean="0"/>
+              <a:pPr>
+                <a:defRPr/>
+              </a:pPr>
+              <a:t>15</a:t>
+            </a:fld>
+            <a:endParaRPr lang="en-US"/>
+          </a:p>
+        </p:txBody>
+      </p:sp>
+    </p:spTree>
+    <p:extLst>
+      <p:ext uri="{BB962C8B-B14F-4D97-AF65-F5344CB8AC3E}">
+        <p14:creationId xmlns:p14="http://schemas.microsoft.com/office/powerpoint/2010/main" val="971958608"/>
+      </p:ext>
+    </p:extLst>
+  </p:cSld>
+  <p:clrMapOvr>
+    <a:masterClrMapping/>
+  </p:clrMapOvr>
+</p:notes>
+</file>
+
+<file path=ppt/notesSlides/notesSlide12.xml><?xml version="1.0" encoding="utf-8"?>
+<p:notes xmlns:a="http://schemas.openxmlformats.org/drawingml/2006/main" xmlns:r="http://schemas.openxmlformats.org/officeDocument/2006/relationships" xmlns:p="http://schemas.openxmlformats.org/presentationml/2006/main">
+  <p:cSld>
+    <p:spTree>
+      <p:nvGrpSpPr>
+        <p:cNvPr id="1" name=""/>
+        <p:cNvGrpSpPr/>
+        <p:nvPr/>
+      </p:nvGrpSpPr>
+      <p:grpSpPr>
+        <a:xfrm>
+          <a:off x="0" y="0"/>
+          <a:ext cx="0" cy="0"/>
+          <a:chOff x="0" y="0"/>
+          <a:chExt cx="0" cy="0"/>
+        </a:xfrm>
+      </p:grpSpPr>
+      <p:sp>
+        <p:nvSpPr>
+          <p:cNvPr id="2" name="Slide Image Placeholder 1"/>
+          <p:cNvSpPr>
+            <a:spLocks noGrp="1" noRot="1" noChangeAspect="1"/>
+          </p:cNvSpPr>
+          <p:nvPr>
+            <p:ph type="sldImg"/>
+          </p:nvPr>
+        </p:nvSpPr>
+        <p:spPr/>
+      </p:sp>
+      <p:sp>
+        <p:nvSpPr>
+          <p:cNvPr id="3" name="Notes Placeholder 2"/>
+          <p:cNvSpPr>
+            <a:spLocks noGrp="1"/>
+          </p:cNvSpPr>
+          <p:nvPr>
+            <p:ph type="body" idx="1"/>
+          </p:nvPr>
+        </p:nvSpPr>
+        <p:spPr/>
+        <p:txBody>
+          <a:bodyPr/>
+          <a:lstStyle/>
+          <a:p>
+            <a:r>
+              <a:rPr lang="es-ES" dirty="0"/>
+              <a:t>Ya existían las UDF “estándar” y se pueden registrar como funciones en </a:t>
+            </a:r>
+            <a:r>
+              <a:rPr lang="es-ES" dirty="0" err="1"/>
+              <a:t>Spark</a:t>
+            </a:r>
+            <a:r>
+              <a:rPr lang="es-ES" dirty="0"/>
+              <a:t> (así se puede combinar </a:t>
+            </a:r>
+            <a:r>
+              <a:rPr lang="es-ES" dirty="0" err="1"/>
+              <a:t>spark</a:t>
+            </a:r>
+            <a:r>
+              <a:rPr lang="es-ES" dirty="0"/>
+              <a:t> </a:t>
+            </a:r>
+            <a:r>
+              <a:rPr lang="es-ES" dirty="0" err="1"/>
+              <a:t>streaming</a:t>
+            </a:r>
+            <a:r>
+              <a:rPr lang="es-ES" dirty="0"/>
+              <a:t> con modelos de ML, se pueden registrar como funciones) pero el rendimiento cuando se trabaja con objetos Pandas (</a:t>
+            </a:r>
+            <a:r>
+              <a:rPr lang="es-ES" dirty="0" err="1"/>
+              <a:t>dataframes</a:t>
+            </a:r>
+            <a:r>
+              <a:rPr lang="es-ES" dirty="0"/>
+              <a:t>, Series) puede ser bastante deficiente, y aparecen las </a:t>
+            </a:r>
+            <a:r>
+              <a:rPr lang="es-ES" dirty="0" err="1"/>
+              <a:t>PandasUDF</a:t>
+            </a:r>
+            <a:r>
+              <a:rPr lang="es-ES" dirty="0"/>
+              <a:t> que soportan vectorización y </a:t>
+            </a:r>
+            <a:r>
+              <a:rPr lang="es-ES" dirty="0" err="1"/>
+              <a:t>chunking</a:t>
+            </a:r>
+            <a:r>
+              <a:rPr lang="es-ES" dirty="0"/>
+              <a:t> en el manejo de los objetos de datos (gracias al uso de Arrow) </a:t>
+            </a:r>
+          </a:p>
+        </p:txBody>
+      </p:sp>
+      <p:sp>
+        <p:nvSpPr>
+          <p:cNvPr id="4" name="Slide Number Placeholder 3"/>
+          <p:cNvSpPr>
+            <a:spLocks noGrp="1"/>
+          </p:cNvSpPr>
+          <p:nvPr>
+            <p:ph type="sldNum" sz="quarter" idx="5"/>
+          </p:nvPr>
+        </p:nvSpPr>
+        <p:spPr/>
+        <p:txBody>
+          <a:bodyPr/>
+          <a:lstStyle/>
+          <a:p>
+            <a:pPr>
+              <a:defRPr/>
+            </a:pPr>
+            <a:fld id="{68148307-6EF4-4902-A089-985E6404F016}" type="slidenum">
+              <a:rPr lang="en-US" smtClean="0"/>
+              <a:pPr>
+                <a:defRPr/>
+              </a:pPr>
+              <a:t>20</a:t>
+            </a:fld>
+            <a:endParaRPr lang="en-US"/>
+          </a:p>
+        </p:txBody>
+      </p:sp>
+    </p:spTree>
+    <p:extLst>
+      <p:ext uri="{BB962C8B-B14F-4D97-AF65-F5344CB8AC3E}">
+        <p14:creationId xmlns:p14="http://schemas.microsoft.com/office/powerpoint/2010/main" val="69715582"/>
+      </p:ext>
+    </p:extLst>
+  </p:cSld>
+  <p:clrMapOvr>
+    <a:masterClrMapping/>
+  </p:clrMapOvr>
+</p:notes>
+</file>
+
+<file path=ppt/notesSlides/notesSlide13.xml><?xml version="1.0" encoding="utf-8"?>
+<p:notes xmlns:a="http://schemas.openxmlformats.org/drawingml/2006/main" xmlns:r="http://schemas.openxmlformats.org/officeDocument/2006/relationships" xmlns:p="http://schemas.openxmlformats.org/presentationml/2006/main">
+  <p:cSld>
+    <p:spTree>
+      <p:nvGrpSpPr>
+        <p:cNvPr id="1" name=""/>
+        <p:cNvGrpSpPr/>
+        <p:nvPr/>
+      </p:nvGrpSpPr>
+      <p:grpSpPr>
+        <a:xfrm>
+          <a:off x="0" y="0"/>
+          <a:ext cx="0" cy="0"/>
+          <a:chOff x="0" y="0"/>
+          <a:chExt cx="0" cy="0"/>
+        </a:xfrm>
+      </p:grpSpPr>
+      <p:sp>
+        <p:nvSpPr>
+          <p:cNvPr id="2" name="Slide Image Placeholder 1"/>
+          <p:cNvSpPr>
+            <a:spLocks noGrp="1" noRot="1" noChangeAspect="1"/>
+          </p:cNvSpPr>
+          <p:nvPr>
+            <p:ph type="sldImg"/>
+          </p:nvPr>
+        </p:nvSpPr>
+        <p:spPr/>
+      </p:sp>
+      <p:sp>
+        <p:nvSpPr>
+          <p:cNvPr id="3" name="Notes Placeholder 2"/>
+          <p:cNvSpPr>
+            <a:spLocks noGrp="1"/>
+          </p:cNvSpPr>
+          <p:nvPr>
+            <p:ph type="body" idx="1"/>
+          </p:nvPr>
+        </p:nvSpPr>
+        <p:spPr/>
+        <p:txBody>
+          <a:bodyPr/>
+          <a:lstStyle/>
+          <a:p>
             <a:pPr marL="0" marR="0" lvl="0" indent="0" algn="l" defTabSz="914400" rtl="0" eaLnBrk="0" fontAlgn="base" latinLnBrk="0" hangingPunct="0">
               <a:lnSpc>
                 <a:spcPct val="100000"/>
@@ -2583,7 +2835,7 @@
 </p:notes>
 </file>
 
-<file path=ppt/notesSlides/notesSlide12.xml><?xml version="1.0" encoding="utf-8"?>
+<file path=ppt/notesSlides/notesSlide14.xml><?xml version="1.0" encoding="utf-8"?>
 <p:notes xmlns:a="http://schemas.openxmlformats.org/drawingml/2006/main" xmlns:r="http://schemas.openxmlformats.org/officeDocument/2006/relationships" xmlns:p="http://schemas.openxmlformats.org/presentationml/2006/main">
   <p:cSld>
     <p:spTree>
@@ -3195,83 +3447,7 @@
           <a:bodyPr/>
           <a:lstStyle/>
           <a:p>
-            <a:pPr marL="0" marR="0" lvl="0" indent="0" algn="l" defTabSz="914400" rtl="0" eaLnBrk="0" fontAlgn="base" latinLnBrk="0" hangingPunct="0">
-              <a:lnSpc>
-                <a:spcPct val="100000"/>
-              </a:lnSpc>
-              <a:spcBef>
-                <a:spcPct val="30000"/>
-              </a:spcBef>
-              <a:spcAft>
-                <a:spcPct val="0"/>
-              </a:spcAft>
-              <a:buClrTx/>
-              <a:buSzTx/>
-              <a:buFontTx/>
-              <a:buNone/>
-              <a:tabLst/>
-              <a:defRPr/>
-            </a:pPr>
-            <a:r>
-              <a:rPr lang="es-ES" dirty="0"/>
-              <a:t>Personalización de periodicidad basado en la transformada de Fourier y su grado (cualquier distribución de serie temporal –o señal periódica, más general) - se puede ajustar cambiando el grado de la transformada de Fourier y sus sumas parciales) </a:t>
-            </a:r>
-            <a:r>
-              <a:rPr lang="es-ES" dirty="0">
-                <a:sym typeface="Wingdings" panose="05000000000000000000" pitchFamily="2" charset="2"/>
-              </a:rPr>
-              <a:t> A más grado, podemos capturar tendencias de ratio de cambio más rápido pero también podemos caer en </a:t>
-            </a:r>
-            <a:r>
-              <a:rPr lang="es-ES" dirty="0" err="1">
-                <a:sym typeface="Wingdings" panose="05000000000000000000" pitchFamily="2" charset="2"/>
-              </a:rPr>
-              <a:t>overfit</a:t>
-            </a:r>
             <a:endParaRPr lang="es-ES" dirty="0"/>
-          </a:p>
-          <a:p>
-            <a:pPr marL="0" marR="0" lvl="0" indent="0" algn="l" defTabSz="914400" rtl="0" eaLnBrk="0" fontAlgn="base" latinLnBrk="0" hangingPunct="0">
-              <a:lnSpc>
-                <a:spcPct val="100000"/>
-              </a:lnSpc>
-              <a:spcBef>
-                <a:spcPct val="30000"/>
-              </a:spcBef>
-              <a:spcAft>
-                <a:spcPct val="0"/>
-              </a:spcAft>
-              <a:buClrTx/>
-              <a:buSzTx/>
-              <a:buFontTx/>
-              <a:buNone/>
-              <a:tabLst/>
-              <a:defRPr/>
-            </a:pPr>
-            <a:endParaRPr lang="es-ES" dirty="0"/>
-          </a:p>
-          <a:p>
-            <a:pPr marL="0" marR="0" lvl="0" indent="0" algn="l" defTabSz="914400" rtl="0" eaLnBrk="0" fontAlgn="base" latinLnBrk="0" hangingPunct="0">
-              <a:lnSpc>
-                <a:spcPct val="100000"/>
-              </a:lnSpc>
-              <a:spcBef>
-                <a:spcPct val="30000"/>
-              </a:spcBef>
-              <a:spcAft>
-                <a:spcPct val="0"/>
-              </a:spcAft>
-              <a:buClrTx/>
-              <a:buSzTx/>
-              <a:buFontTx/>
-              <a:buNone/>
-              <a:tabLst/>
-              <a:defRPr/>
-            </a:pPr>
-            <a:r>
-              <a:rPr lang="es-ES" dirty="0"/>
-              <a:t>Personalización de periodicidad basado en cálculos personalizados (temporadas comerciales, deportivas, </a:t>
-            </a:r>
           </a:p>
         </p:txBody>
       </p:sp>
@@ -3298,7 +3474,7 @@
               <a:pPr>
                 <a:defRPr/>
               </a:pPr>
-              <a:t>10</a:t>
+              <a:t>8</a:t>
             </a:fld>
             <a:endParaRPr lang="en-US"/>
           </a:p>
@@ -3307,7 +3483,7 @@
     </p:spTree>
     <p:extLst>
       <p:ext uri="{BB962C8B-B14F-4D97-AF65-F5344CB8AC3E}">
-        <p14:creationId xmlns:p14="http://schemas.microsoft.com/office/powerpoint/2010/main" val="2901159531"/>
+        <p14:creationId xmlns:p14="http://schemas.microsoft.com/office/powerpoint/2010/main" val="2955558592"/>
       </p:ext>
     </p:extLst>
   </p:cSld>
@@ -3464,7 +3640,7 @@
               <a:pPr>
                 <a:defRPr/>
               </a:pPr>
-              <a:t>11</a:t>
+              <a:t>10</a:t>
             </a:fld>
             <a:endParaRPr lang="en-US"/>
           </a:p>
@@ -3473,7 +3649,7 @@
     </p:spTree>
     <p:extLst>
       <p:ext uri="{BB962C8B-B14F-4D97-AF65-F5344CB8AC3E}">
-        <p14:creationId xmlns:p14="http://schemas.microsoft.com/office/powerpoint/2010/main" val="1839089741"/>
+        <p14:creationId xmlns:p14="http://schemas.microsoft.com/office/powerpoint/2010/main" val="2901159531"/>
       </p:ext>
     </p:extLst>
   </p:cSld>
@@ -3546,7 +3722,63 @@
             </a:pPr>
             <a:r>
               <a:rPr lang="es-ES" dirty="0"/>
-              <a:t>Personalización de periodicidad basado en cálculos personalizados (temporadas comerciales, deportivas, interrelaciones entre eventos sociales y actividad comercial…) </a:t>
+              <a:t>Personalización de periodicidad basado en la transformada de Fourier y su grado (cualquier distribución de serie temporal –o señal periódica, más general) - se puede ajustar cambiando el grado de la transformada de Fourier y sus sumas parciales) </a:t>
+            </a:r>
+            <a:r>
+              <a:rPr lang="es-ES" dirty="0">
+                <a:sym typeface="Wingdings" panose="05000000000000000000" pitchFamily="2" charset="2"/>
+              </a:rPr>
+              <a:t> A más grado, podemos capturar tendencias de ratio de cambio más rápido pero también podemos caer en </a:t>
+            </a:r>
+            <a:r>
+              <a:rPr lang="es-ES" dirty="0" err="1">
+                <a:sym typeface="Wingdings" panose="05000000000000000000" pitchFamily="2" charset="2"/>
+              </a:rPr>
+              <a:t>overfit</a:t>
+            </a:r>
+            <a:endParaRPr lang="es-ES" dirty="0"/>
+          </a:p>
+          <a:p>
+            <a:pPr marL="0" marR="0" lvl="0" indent="0" algn="l" defTabSz="914400" rtl="0" eaLnBrk="0" fontAlgn="base" latinLnBrk="0" hangingPunct="0">
+              <a:lnSpc>
+                <a:spcPct val="100000"/>
+              </a:lnSpc>
+              <a:spcBef>
+                <a:spcPct val="30000"/>
+              </a:spcBef>
+              <a:spcAft>
+                <a:spcPct val="0"/>
+              </a:spcAft>
+              <a:buClrTx/>
+              <a:buSzTx/>
+              <a:buFontTx/>
+              <a:buNone/>
+              <a:tabLst/>
+              <a:defRPr/>
+            </a:pPr>
+            <a:endParaRPr lang="es-ES" dirty="0"/>
+          </a:p>
+          <a:p>
+            <a:pPr marL="0" marR="0" lvl="0" indent="0" algn="l" defTabSz="914400" rtl="0" eaLnBrk="0" fontAlgn="base" latinLnBrk="0" hangingPunct="0">
+              <a:lnSpc>
+                <a:spcPct val="100000"/>
+              </a:lnSpc>
+              <a:spcBef>
+                <a:spcPct val="30000"/>
+              </a:spcBef>
+              <a:spcAft>
+                <a:spcPct val="0"/>
+              </a:spcAft>
+              <a:buClrTx/>
+              <a:buSzTx/>
+              <a:buFontTx/>
+              <a:buNone/>
+              <a:tabLst/>
+              <a:defRPr/>
+            </a:pPr>
+            <a:r>
+              <a:rPr lang="es-ES" dirty="0"/>
+              <a:t>Personalización de periodicidad basado en cálculos personalizados (temporadas comerciales, deportivas, </a:t>
             </a:r>
           </a:p>
         </p:txBody>
@@ -3574,7 +3806,7 @@
               <a:pPr>
                 <a:defRPr/>
               </a:pPr>
-              <a:t>12</a:t>
+              <a:t>11</a:t>
             </a:fld>
             <a:endParaRPr lang="en-US"/>
           </a:p>
@@ -3583,7 +3815,7 @@
     </p:spTree>
     <p:extLst>
       <p:ext uri="{BB962C8B-B14F-4D97-AF65-F5344CB8AC3E}">
-        <p14:creationId xmlns:p14="http://schemas.microsoft.com/office/powerpoint/2010/main" val="1812032627"/>
+        <p14:creationId xmlns:p14="http://schemas.microsoft.com/office/powerpoint/2010/main" val="1839089741"/>
       </p:ext>
     </p:extLst>
   </p:cSld>
@@ -3656,58 +3888,7 @@
             </a:pPr>
             <a:r>
               <a:rPr lang="es-ES" dirty="0"/>
-              <a:t>Si tenemos </a:t>
-            </a:r>
-            <a:r>
-              <a:rPr lang="es-ES" dirty="0" err="1"/>
-              <a:t>outliers</a:t>
-            </a:r>
-            <a:r>
-              <a:rPr lang="es-ES" dirty="0"/>
-              <a:t> y dato faltante puede afectar a nuestro modelo y a la incertidumbre en sus predicciones</a:t>
-            </a:r>
-          </a:p>
-          <a:p>
-            <a:pPr marL="0" marR="0" lvl="0" indent="0" algn="l" defTabSz="914400" rtl="0" eaLnBrk="0" fontAlgn="base" latinLnBrk="0" hangingPunct="0">
-              <a:lnSpc>
-                <a:spcPct val="100000"/>
-              </a:lnSpc>
-              <a:spcBef>
-                <a:spcPct val="30000"/>
-              </a:spcBef>
-              <a:spcAft>
-                <a:spcPct val="0"/>
-              </a:spcAft>
-              <a:buClrTx/>
-              <a:buSzTx/>
-              <a:buFontTx/>
-              <a:buNone/>
-              <a:tabLst/>
-              <a:defRPr/>
-            </a:pPr>
-            <a:endParaRPr lang="es-ES" dirty="0"/>
-          </a:p>
-          <a:p>
-            <a:pPr marL="0" marR="0" lvl="0" indent="0" algn="l" defTabSz="914400" rtl="0" eaLnBrk="0" fontAlgn="base" latinLnBrk="0" hangingPunct="0">
-              <a:lnSpc>
-                <a:spcPct val="100000"/>
-              </a:lnSpc>
-              <a:spcBef>
-                <a:spcPct val="30000"/>
-              </a:spcBef>
-              <a:spcAft>
-                <a:spcPct val="0"/>
-              </a:spcAft>
-              <a:buClrTx/>
-              <a:buSzTx/>
-              <a:buFontTx/>
-              <a:buNone/>
-              <a:tabLst/>
-              <a:defRPr/>
-            </a:pPr>
-            <a:r>
-              <a:rPr lang="es-ES" dirty="0"/>
-              <a:t>El dato faltante puede generar errores directamente si antes no lo interpolamos</a:t>
+              <a:t>Personalización de periodicidad basado en cálculos personalizados (temporadas comerciales, deportivas, interrelaciones entre eventos sociales y actividad comercial…) </a:t>
             </a:r>
           </a:p>
         </p:txBody>
@@ -3735,7 +3916,7 @@
               <a:pPr>
                 <a:defRPr/>
               </a:pPr>
-              <a:t>13</a:t>
+              <a:t>12</a:t>
             </a:fld>
             <a:endParaRPr lang="en-US"/>
           </a:p>
@@ -3744,7 +3925,7 @@
     </p:spTree>
     <p:extLst>
       <p:ext uri="{BB962C8B-B14F-4D97-AF65-F5344CB8AC3E}">
-        <p14:creationId xmlns:p14="http://schemas.microsoft.com/office/powerpoint/2010/main" val="1068841822"/>
+        <p14:creationId xmlns:p14="http://schemas.microsoft.com/office/powerpoint/2010/main" val="1812032627"/>
       </p:ext>
     </p:extLst>
   </p:cSld>
@@ -19760,10 +19941,10 @@
       </p:sp>
       <p:graphicFrame>
         <p:nvGraphicFramePr>
-          <p:cNvPr id="5" name="Chart 4">
+          <p:cNvPr id="6" name="Chart 5">
             <a:extLst>
               <a:ext uri="{FF2B5EF4-FFF2-40B4-BE49-F238E27FC236}">
-                <a16:creationId xmlns:a16="http://schemas.microsoft.com/office/drawing/2014/main" id="{9C4650AE-17E7-4570-AE91-282C0A0418D3}"/>
+                <a16:creationId xmlns:a16="http://schemas.microsoft.com/office/drawing/2014/main" id="{DF51B48A-C5A4-45DC-8381-AD29DC75636B}"/>
               </a:ext>
             </a:extLst>
           </p:cNvPr>
@@ -19773,14 +19954,14 @@
           <p:nvPr>
             <p:extLst>
               <p:ext uri="{D42A27DB-BD31-4B8C-83A1-F6EECF244321}">
-                <p14:modId xmlns:p14="http://schemas.microsoft.com/office/powerpoint/2010/main" val="926661166"/>
+                <p14:modId xmlns:p14="http://schemas.microsoft.com/office/powerpoint/2010/main" val="1767238091"/>
               </p:ext>
             </p:extLst>
           </p:nvPr>
         </p:nvGraphicFramePr>
         <p:xfrm>
-          <a:off x="2461926" y="1099322"/>
-          <a:ext cx="7186613" cy="4976813"/>
+          <a:off x="2563554" y="946922"/>
+          <a:ext cx="7707497" cy="5077642"/>
         </p:xfrm>
         <a:graphic>
           <a:graphicData uri="http://schemas.openxmlformats.org/drawingml/2006/chart">

</xml_diff>